<commit_message>
Start of work on case study
</commit_message>
<xml_diff>
--- a/casestudy.pptx
+++ b/casestudy.pptx
@@ -5,12 +5,16 @@
     <p:sldMasterId id="2147483672" r:id="rId1"/>
   </p:sldMasterIdLst>
   <p:notesMasterIdLst>
-    <p:notesMasterId r:id="rId5"/>
+    <p:notesMasterId r:id="rId9"/>
   </p:notesMasterIdLst>
   <p:sldIdLst>
     <p:sldId id="256" r:id="rId2"/>
     <p:sldId id="258" r:id="rId3"/>
-    <p:sldId id="257" r:id="rId4"/>
+    <p:sldId id="259" r:id="rId4"/>
+    <p:sldId id="260" r:id="rId5"/>
+    <p:sldId id="261" r:id="rId6"/>
+    <p:sldId id="262" r:id="rId7"/>
+    <p:sldId id="257" r:id="rId8"/>
   </p:sldIdLst>
   <p:sldSz cx="12192000" cy="6858000"/>
   <p:notesSz cx="6858000" cy="9144000"/>
@@ -109,6 +113,14 @@
       </a:defRPr>
     </a:lvl9pPr>
   </p:defaultTextStyle>
+  <p:extLst>
+    <p:ext uri="{EFAFB233-063F-42B5-8137-9DF3F51BA10A}">
+      <p15:sldGuideLst xmlns:p15="http://schemas.microsoft.com/office/powerpoint/2012/main"/>
+    </p:ext>
+    <p:ext uri="{2D200454-40CA-4A62-9FC3-DE9A4176ACB9}">
+      <p15:notesGuideLst xmlns:p15="http://schemas.microsoft.com/office/powerpoint/2012/main"/>
+    </p:ext>
+  </p:extLst>
 </p:presentation>
 </file>
 
@@ -3346,12 +3358,38 @@
             <p:ph type="ctrTitle"/>
           </p:nvPr>
         </p:nvSpPr>
-        <p:spPr/>
-        <p:txBody>
-          <a:bodyPr/>
-          <a:lstStyle/>
-          <a:p>
-            <a:endParaRPr lang="pl-PL"/>
+        <p:spPr>
+          <a:xfrm>
+            <a:off x="0" y="1600199"/>
+            <a:ext cx="12192000" cy="1909763"/>
+          </a:xfrm>
+        </p:spPr>
+        <p:txBody>
+          <a:bodyPr>
+            <a:noAutofit/>
+          </a:bodyPr>
+          <a:lstStyle/>
+          <a:p>
+            <a:r>
+              <a:rPr lang="pl-PL" sz="5400" dirty="0">
+                <a:latin typeface="Arial" panose="020B0604020202020204" pitchFamily="34" charset="0"/>
+                <a:cs typeface="Arial" panose="020B0604020202020204" pitchFamily="34" charset="0"/>
+              </a:rPr>
+              <a:t>Analiza zarobków absolwentów studiów wyższych pięć lat </a:t>
+            </a:r>
+            <a:br>
+              <a:rPr lang="pl-PL" sz="5400" dirty="0">
+                <a:latin typeface="Arial" panose="020B0604020202020204" pitchFamily="34" charset="0"/>
+                <a:cs typeface="Arial" panose="020B0604020202020204" pitchFamily="34" charset="0"/>
+              </a:rPr>
+            </a:br>
+            <a:r>
+              <a:rPr lang="pl-PL" sz="5400" dirty="0">
+                <a:latin typeface="Arial" panose="020B0604020202020204" pitchFamily="34" charset="0"/>
+                <a:cs typeface="Arial" panose="020B0604020202020204" pitchFamily="34" charset="0"/>
+              </a:rPr>
+              <a:t>po uzyskaniu dyplomu</a:t>
+            </a:r>
           </a:p>
         </p:txBody>
       </p:sp>
@@ -3371,12 +3409,54 @@
             <p:ph type="subTitle" idx="1"/>
           </p:nvPr>
         </p:nvSpPr>
-        <p:spPr/>
-        <p:txBody>
-          <a:bodyPr/>
-          <a:lstStyle/>
-          <a:p>
-            <a:endParaRPr lang="pl-PL"/>
+        <p:spPr>
+          <a:xfrm>
+            <a:off x="1080001" y="3750197"/>
+            <a:ext cx="9788628" cy="3107803"/>
+          </a:xfrm>
+        </p:spPr>
+        <p:txBody>
+          <a:bodyPr>
+            <a:normAutofit/>
+          </a:bodyPr>
+          <a:lstStyle/>
+          <a:p>
+            <a:pPr marL="720000" algn="r"/>
+            <a:endParaRPr lang="pl-PL" sz="2800" dirty="0">
+              <a:latin typeface="Arial" panose="020B0604020202020204" pitchFamily="34" charset="0"/>
+              <a:cs typeface="Arial" panose="020B0604020202020204" pitchFamily="34" charset="0"/>
+            </a:endParaRPr>
+          </a:p>
+          <a:p>
+            <a:pPr marL="720000" algn="r"/>
+            <a:endParaRPr lang="pl-PL" sz="2800" dirty="0">
+              <a:latin typeface="Arial" panose="020B0604020202020204" pitchFamily="34" charset="0"/>
+              <a:cs typeface="Arial" panose="020B0604020202020204" pitchFamily="34" charset="0"/>
+            </a:endParaRPr>
+          </a:p>
+          <a:p>
+            <a:pPr marL="720000" algn="r"/>
+            <a:endParaRPr lang="pl-PL" sz="2800" dirty="0">
+              <a:latin typeface="Arial" panose="020B0604020202020204" pitchFamily="34" charset="0"/>
+              <a:cs typeface="Arial" panose="020B0604020202020204" pitchFamily="34" charset="0"/>
+            </a:endParaRPr>
+          </a:p>
+          <a:p>
+            <a:pPr marL="720000" algn="r"/>
+            <a:endParaRPr lang="pl-PL" sz="2800" dirty="0">
+              <a:latin typeface="Arial" panose="020B0604020202020204" pitchFamily="34" charset="0"/>
+              <a:cs typeface="Arial" panose="020B0604020202020204" pitchFamily="34" charset="0"/>
+            </a:endParaRPr>
+          </a:p>
+          <a:p>
+            <a:pPr marL="720000" algn="r"/>
+            <a:r>
+              <a:rPr lang="pl-PL" sz="2800" dirty="0">
+                <a:latin typeface="Arial" panose="020B0604020202020204" pitchFamily="34" charset="0"/>
+                <a:cs typeface="Arial" panose="020B0604020202020204" pitchFamily="34" charset="0"/>
+              </a:rPr>
+              <a:t>Przygotował: Kamil Kulesza</a:t>
+            </a:r>
           </a:p>
         </p:txBody>
       </p:sp>
@@ -3434,12 +3514,29 @@
             <p:ph type="title"/>
           </p:nvPr>
         </p:nvSpPr>
-        <p:spPr/>
-        <p:txBody>
-          <a:bodyPr/>
-          <a:lstStyle/>
-          <a:p>
-            <a:endParaRPr lang="pl-PL"/>
+        <p:spPr>
+          <a:xfrm>
+            <a:off x="0" y="180001"/>
+            <a:ext cx="12192000" cy="758980"/>
+          </a:xfrm>
+        </p:spPr>
+        <p:txBody>
+          <a:bodyPr>
+            <a:normAutofit/>
+          </a:bodyPr>
+          <a:lstStyle/>
+          <a:p>
+            <a:pPr marL="1080000"/>
+            <a:r>
+              <a:rPr lang="pl-PL" sz="4000" dirty="0">
+                <a:solidFill>
+                  <a:srgbClr val="002060"/>
+                </a:solidFill>
+                <a:latin typeface="Arial" panose="020B0604020202020204" pitchFamily="34" charset="0"/>
+                <a:cs typeface="Arial" panose="020B0604020202020204" pitchFamily="34" charset="0"/>
+              </a:rPr>
+              <a:t>Informacje o badaniu</a:t>
+            </a:r>
           </a:p>
         </p:txBody>
       </p:sp>
@@ -3459,12 +3556,289 @@
             <p:ph idx="1"/>
           </p:nvPr>
         </p:nvSpPr>
-        <p:spPr/>
-        <p:txBody>
-          <a:bodyPr/>
-          <a:lstStyle/>
-          <a:p>
-            <a:endParaRPr lang="pl-PL"/>
+        <p:spPr>
+          <a:xfrm>
+            <a:off x="0" y="1237130"/>
+            <a:ext cx="11112000" cy="4528970"/>
+          </a:xfrm>
+        </p:spPr>
+        <p:txBody>
+          <a:bodyPr>
+            <a:normAutofit/>
+          </a:bodyPr>
+          <a:lstStyle/>
+          <a:p>
+            <a:pPr marL="1080000" indent="0" algn="just">
+              <a:buNone/>
+            </a:pPr>
+            <a:r>
+              <a:rPr lang="pl-PL" sz="2400" dirty="0">
+                <a:latin typeface="Arial" panose="020B0604020202020204" pitchFamily="34" charset="0"/>
+                <a:cs typeface="Arial" panose="020B0604020202020204" pitchFamily="34" charset="0"/>
+              </a:rPr>
+              <a:t>	Przeprowadzone badanie ma na celu ukazać jak kształtują się zarobki absolwentów studiów magisterskich polskich uczelni pięć lat na pozyskaniu dyplomu. Dostępne dane pozwalają na przeprowadzenie analizy bazując na absolwentach lat 2014 i 2015.</a:t>
+            </a:r>
+          </a:p>
+          <a:p>
+            <a:pPr marL="1080000" indent="0" algn="just">
+              <a:buNone/>
+            </a:pPr>
+            <a:r>
+              <a:rPr lang="pl-PL" sz="2400" dirty="0">
+                <a:latin typeface="Arial" panose="020B0604020202020204" pitchFamily="34" charset="0"/>
+                <a:cs typeface="Arial" panose="020B0604020202020204" pitchFamily="34" charset="0"/>
+              </a:rPr>
+              <a:t>	Wykorzystane w badaniu dane pochodzą z serwisu systemu Ekonomicznych Losów Absolwentów szkół wyższych (ELA) </a:t>
+            </a:r>
+            <a:r>
+              <a:rPr lang="pl-PL" sz="2400" dirty="0">
+                <a:solidFill>
+                  <a:schemeClr val="accent4"/>
+                </a:solidFill>
+                <a:latin typeface="Arial" panose="020B0604020202020204" pitchFamily="34" charset="0"/>
+                <a:cs typeface="Arial" panose="020B0604020202020204" pitchFamily="34" charset="0"/>
+                <a:hlinkClick r:id="rId2">
+                  <a:extLst>
+                    <a:ext uri="{A12FA001-AC4F-418D-AE19-62706E023703}">
+                      <ahyp:hlinkClr xmlns:ahyp="http://schemas.microsoft.com/office/drawing/2018/hyperlinkcolor" val="tx"/>
+                    </a:ext>
+                  </a:extLst>
+                </a:hlinkClick>
+              </a:rPr>
+              <a:t>www.ela.nauka.gov.pl</a:t>
+            </a:r>
+            <a:r>
+              <a:rPr lang="pl-PL" sz="2400" dirty="0">
+                <a:solidFill>
+                  <a:schemeClr val="accent4"/>
+                </a:solidFill>
+                <a:latin typeface="Arial" panose="020B0604020202020204" pitchFamily="34" charset="0"/>
+                <a:cs typeface="Arial" panose="020B0604020202020204" pitchFamily="34" charset="0"/>
+              </a:rPr>
+              <a:t>.</a:t>
+            </a:r>
+          </a:p>
+          <a:p>
+            <a:pPr marL="1080000" indent="0" algn="just">
+              <a:buNone/>
+            </a:pPr>
+            <a:endParaRPr lang="pl-PL" sz="2400" dirty="0">
+              <a:solidFill>
+                <a:schemeClr val="accent4"/>
+              </a:solidFill>
+              <a:latin typeface="Arial" panose="020B0604020202020204" pitchFamily="34" charset="0"/>
+              <a:cs typeface="Arial" panose="020B0604020202020204" pitchFamily="34" charset="0"/>
+            </a:endParaRPr>
+          </a:p>
+        </p:txBody>
+      </p:sp>
+      <p:sp>
+        <p:nvSpPr>
+          <p:cNvPr id="7" name="Symbol zastępczy zawartości 12">
+            <a:extLst>
+              <a:ext uri="{FF2B5EF4-FFF2-40B4-BE49-F238E27FC236}">
+                <a16:creationId xmlns:a16="http://schemas.microsoft.com/office/drawing/2014/main" id="{28670177-31EF-45B8-9694-7BE806BE5EC0}"/>
+              </a:ext>
+            </a:extLst>
+          </p:cNvPr>
+          <p:cNvSpPr txBox="1">
+            <a:spLocks/>
+          </p:cNvSpPr>
+          <p:nvPr/>
+        </p:nvSpPr>
+        <p:spPr>
+          <a:xfrm>
+            <a:off x="0" y="6260951"/>
+            <a:ext cx="12192000" cy="417047"/>
+          </a:xfrm>
+          <a:prstGeom prst="rect">
+            <a:avLst/>
+          </a:prstGeom>
+        </p:spPr>
+        <p:txBody>
+          <a:bodyPr vert="horz" lIns="91440" tIns="45720" rIns="91440" bIns="45720" rtlCol="0">
+            <a:normAutofit/>
+          </a:bodyPr>
+          <a:lstStyle>
+            <a:lvl1pPr marL="228600" indent="-228600" algn="l" defTabSz="914400" rtl="0" eaLnBrk="1" latinLnBrk="0" hangingPunct="1">
+              <a:lnSpc>
+                <a:spcPct val="90000"/>
+              </a:lnSpc>
+              <a:spcBef>
+                <a:spcPts val="1000"/>
+              </a:spcBef>
+              <a:buFont typeface="Arial" panose="020B0604020202020204" pitchFamily="34" charset="0"/>
+              <a:buChar char="•"/>
+              <a:defRPr sz="2800" kern="1200">
+                <a:solidFill>
+                  <a:schemeClr val="tx1"/>
+                </a:solidFill>
+                <a:latin typeface="+mn-lt"/>
+                <a:ea typeface="+mn-ea"/>
+                <a:cs typeface="+mn-cs"/>
+              </a:defRPr>
+            </a:lvl1pPr>
+            <a:lvl2pPr marL="685800" indent="-228600" algn="l" defTabSz="914400" rtl="0" eaLnBrk="1" latinLnBrk="0" hangingPunct="1">
+              <a:lnSpc>
+                <a:spcPct val="90000"/>
+              </a:lnSpc>
+              <a:spcBef>
+                <a:spcPts val="500"/>
+              </a:spcBef>
+              <a:buFont typeface="Arial" panose="020B0604020202020204" pitchFamily="34" charset="0"/>
+              <a:buChar char="•"/>
+              <a:defRPr sz="2400" kern="1200">
+                <a:solidFill>
+                  <a:schemeClr val="tx1"/>
+                </a:solidFill>
+                <a:latin typeface="+mn-lt"/>
+                <a:ea typeface="+mn-ea"/>
+                <a:cs typeface="+mn-cs"/>
+              </a:defRPr>
+            </a:lvl2pPr>
+            <a:lvl3pPr marL="1143000" indent="-228600" algn="l" defTabSz="914400" rtl="0" eaLnBrk="1" latinLnBrk="0" hangingPunct="1">
+              <a:lnSpc>
+                <a:spcPct val="90000"/>
+              </a:lnSpc>
+              <a:spcBef>
+                <a:spcPts val="500"/>
+              </a:spcBef>
+              <a:buFont typeface="Arial" panose="020B0604020202020204" pitchFamily="34" charset="0"/>
+              <a:buChar char="•"/>
+              <a:defRPr sz="2000" kern="1200">
+                <a:solidFill>
+                  <a:schemeClr val="tx1"/>
+                </a:solidFill>
+                <a:latin typeface="+mn-lt"/>
+                <a:ea typeface="+mn-ea"/>
+                <a:cs typeface="+mn-cs"/>
+              </a:defRPr>
+            </a:lvl3pPr>
+            <a:lvl4pPr marL="1600200" indent="-228600" algn="l" defTabSz="914400" rtl="0" eaLnBrk="1" latinLnBrk="0" hangingPunct="1">
+              <a:lnSpc>
+                <a:spcPct val="90000"/>
+              </a:lnSpc>
+              <a:spcBef>
+                <a:spcPts val="500"/>
+              </a:spcBef>
+              <a:buFont typeface="Arial" panose="020B0604020202020204" pitchFamily="34" charset="0"/>
+              <a:buChar char="•"/>
+              <a:defRPr sz="1800" kern="1200">
+                <a:solidFill>
+                  <a:schemeClr val="tx1"/>
+                </a:solidFill>
+                <a:latin typeface="+mn-lt"/>
+                <a:ea typeface="+mn-ea"/>
+                <a:cs typeface="+mn-cs"/>
+              </a:defRPr>
+            </a:lvl4pPr>
+            <a:lvl5pPr marL="2057400" indent="-228600" algn="l" defTabSz="914400" rtl="0" eaLnBrk="1" latinLnBrk="0" hangingPunct="1">
+              <a:lnSpc>
+                <a:spcPct val="90000"/>
+              </a:lnSpc>
+              <a:spcBef>
+                <a:spcPts val="500"/>
+              </a:spcBef>
+              <a:buFont typeface="Arial" panose="020B0604020202020204" pitchFamily="34" charset="0"/>
+              <a:buChar char="•"/>
+              <a:defRPr sz="1800" kern="1200">
+                <a:solidFill>
+                  <a:schemeClr val="tx1"/>
+                </a:solidFill>
+                <a:latin typeface="+mn-lt"/>
+                <a:ea typeface="+mn-ea"/>
+                <a:cs typeface="+mn-cs"/>
+              </a:defRPr>
+            </a:lvl5pPr>
+            <a:lvl6pPr marL="2514600" indent="-228600" algn="l" defTabSz="914400" rtl="0" eaLnBrk="1" latinLnBrk="0" hangingPunct="1">
+              <a:lnSpc>
+                <a:spcPct val="90000"/>
+              </a:lnSpc>
+              <a:spcBef>
+                <a:spcPts val="500"/>
+              </a:spcBef>
+              <a:buFont typeface="Arial" panose="020B0604020202020204" pitchFamily="34" charset="0"/>
+              <a:buChar char="•"/>
+              <a:defRPr sz="1800" kern="1200">
+                <a:solidFill>
+                  <a:schemeClr val="tx1"/>
+                </a:solidFill>
+                <a:latin typeface="+mn-lt"/>
+                <a:ea typeface="+mn-ea"/>
+                <a:cs typeface="+mn-cs"/>
+              </a:defRPr>
+            </a:lvl6pPr>
+            <a:lvl7pPr marL="2971800" indent="-228600" algn="l" defTabSz="914400" rtl="0" eaLnBrk="1" latinLnBrk="0" hangingPunct="1">
+              <a:lnSpc>
+                <a:spcPct val="90000"/>
+              </a:lnSpc>
+              <a:spcBef>
+                <a:spcPts val="500"/>
+              </a:spcBef>
+              <a:buFont typeface="Arial" panose="020B0604020202020204" pitchFamily="34" charset="0"/>
+              <a:buChar char="•"/>
+              <a:defRPr sz="1800" kern="1200">
+                <a:solidFill>
+                  <a:schemeClr val="tx1"/>
+                </a:solidFill>
+                <a:latin typeface="+mn-lt"/>
+                <a:ea typeface="+mn-ea"/>
+                <a:cs typeface="+mn-cs"/>
+              </a:defRPr>
+            </a:lvl7pPr>
+            <a:lvl8pPr marL="3429000" indent="-228600" algn="l" defTabSz="914400" rtl="0" eaLnBrk="1" latinLnBrk="0" hangingPunct="1">
+              <a:lnSpc>
+                <a:spcPct val="90000"/>
+              </a:lnSpc>
+              <a:spcBef>
+                <a:spcPts val="500"/>
+              </a:spcBef>
+              <a:buFont typeface="Arial" panose="020B0604020202020204" pitchFamily="34" charset="0"/>
+              <a:buChar char="•"/>
+              <a:defRPr sz="1800" kern="1200">
+                <a:solidFill>
+                  <a:schemeClr val="tx1"/>
+                </a:solidFill>
+                <a:latin typeface="+mn-lt"/>
+                <a:ea typeface="+mn-ea"/>
+                <a:cs typeface="+mn-cs"/>
+              </a:defRPr>
+            </a:lvl8pPr>
+            <a:lvl9pPr marL="3886200" indent="-228600" algn="l" defTabSz="914400" rtl="0" eaLnBrk="1" latinLnBrk="0" hangingPunct="1">
+              <a:lnSpc>
+                <a:spcPct val="90000"/>
+              </a:lnSpc>
+              <a:spcBef>
+                <a:spcPts val="500"/>
+              </a:spcBef>
+              <a:buFont typeface="Arial" panose="020B0604020202020204" pitchFamily="34" charset="0"/>
+              <a:buChar char="•"/>
+              <a:defRPr sz="1800" kern="1200">
+                <a:solidFill>
+                  <a:schemeClr val="tx1"/>
+                </a:solidFill>
+                <a:latin typeface="+mn-lt"/>
+                <a:ea typeface="+mn-ea"/>
+                <a:cs typeface="+mn-cs"/>
+              </a:defRPr>
+            </a:lvl9pPr>
+          </a:lstStyle>
+          <a:p>
+            <a:pPr marL="0" indent="0" algn="ctr">
+              <a:buFont typeface="Arial" panose="020B0604020202020204" pitchFamily="34" charset="0"/>
+              <a:buNone/>
+            </a:pPr>
+            <a:r>
+              <a:rPr lang="pl-PL" sz="2000" dirty="0">
+                <a:latin typeface="Arial" panose="020B0604020202020204" pitchFamily="34" charset="0"/>
+                <a:cs typeface="Arial" panose="020B0604020202020204" pitchFamily="34" charset="0"/>
+              </a:rPr>
+              <a:t>1</a:t>
+            </a:r>
+            <a:endParaRPr lang="pl-PL" sz="1800" dirty="0">
+              <a:latin typeface="Arial" panose="020B0604020202020204" pitchFamily="34" charset="0"/>
+              <a:cs typeface="Arial" panose="020B0604020202020204" pitchFamily="34" charset="0"/>
+            </a:endParaRPr>
           </a:p>
         </p:txBody>
       </p:sp>
@@ -3482,6 +3856,1498 @@
 </file>
 
 <file path=ppt/slides/slide3.xml><?xml version="1.0" encoding="utf-8"?>
+<p:sld xmlns:a="http://schemas.openxmlformats.org/drawingml/2006/main" xmlns:r="http://schemas.openxmlformats.org/officeDocument/2006/relationships" xmlns:p="http://schemas.openxmlformats.org/presentationml/2006/main">
+  <p:cSld>
+    <p:bg>
+      <p:bgPr>
+        <a:solidFill>
+          <a:srgbClr val="EFEDEF"/>
+        </a:solidFill>
+        <a:effectLst/>
+      </p:bgPr>
+    </p:bg>
+    <p:spTree>
+      <p:nvGrpSpPr>
+        <p:cNvPr id="1" name=""/>
+        <p:cNvGrpSpPr/>
+        <p:nvPr/>
+      </p:nvGrpSpPr>
+      <p:grpSpPr>
+        <a:xfrm>
+          <a:off x="0" y="0"/>
+          <a:ext cx="0" cy="0"/>
+          <a:chOff x="0" y="0"/>
+          <a:chExt cx="0" cy="0"/>
+        </a:xfrm>
+      </p:grpSpPr>
+      <p:sp>
+        <p:nvSpPr>
+          <p:cNvPr id="11" name="Tytuł 10">
+            <a:extLst>
+              <a:ext uri="{FF2B5EF4-FFF2-40B4-BE49-F238E27FC236}">
+                <a16:creationId xmlns:a16="http://schemas.microsoft.com/office/drawing/2014/main" id="{E6572A4F-AEE0-4C43-A19A-0A4EFDB11758}"/>
+              </a:ext>
+            </a:extLst>
+          </p:cNvPr>
+          <p:cNvSpPr>
+            <a:spLocks noGrp="1"/>
+          </p:cNvSpPr>
+          <p:nvPr>
+            <p:ph type="title"/>
+          </p:nvPr>
+        </p:nvSpPr>
+        <p:spPr>
+          <a:xfrm>
+            <a:off x="0" y="180001"/>
+            <a:ext cx="12192000" cy="758980"/>
+          </a:xfrm>
+        </p:spPr>
+        <p:txBody>
+          <a:bodyPr>
+            <a:normAutofit/>
+          </a:bodyPr>
+          <a:lstStyle/>
+          <a:p>
+            <a:pPr marL="1080000"/>
+            <a:r>
+              <a:rPr lang="pl-PL" sz="4000" dirty="0">
+                <a:solidFill>
+                  <a:srgbClr val="002060"/>
+                </a:solidFill>
+                <a:latin typeface="Arial" panose="020B0604020202020204" pitchFamily="34" charset="0"/>
+                <a:cs typeface="Arial" panose="020B0604020202020204" pitchFamily="34" charset="0"/>
+              </a:rPr>
+              <a:t>Dziedzina i forma studiów</a:t>
+            </a:r>
+          </a:p>
+        </p:txBody>
+      </p:sp>
+      <p:sp>
+        <p:nvSpPr>
+          <p:cNvPr id="13" name="Symbol zastępczy zawartości 12">
+            <a:extLst>
+              <a:ext uri="{FF2B5EF4-FFF2-40B4-BE49-F238E27FC236}">
+                <a16:creationId xmlns:a16="http://schemas.microsoft.com/office/drawing/2014/main" id="{DA401464-8C74-4E2C-AA34-162A596EE429}"/>
+              </a:ext>
+            </a:extLst>
+          </p:cNvPr>
+          <p:cNvSpPr>
+            <a:spLocks noGrp="1"/>
+          </p:cNvSpPr>
+          <p:nvPr>
+            <p:ph idx="1"/>
+          </p:nvPr>
+        </p:nvSpPr>
+        <p:spPr>
+          <a:xfrm>
+            <a:off x="0" y="1237130"/>
+            <a:ext cx="11139948" cy="4528970"/>
+          </a:xfrm>
+        </p:spPr>
+        <p:txBody>
+          <a:bodyPr>
+            <a:normAutofit/>
+          </a:bodyPr>
+          <a:lstStyle/>
+          <a:p>
+            <a:pPr marL="1080000" indent="0" algn="just">
+              <a:buNone/>
+            </a:pPr>
+            <a:r>
+              <a:rPr lang="pl-PL" sz="2300" dirty="0">
+                <a:latin typeface="Arial" panose="020B0604020202020204" pitchFamily="34" charset="0"/>
+                <a:cs typeface="Arial" panose="020B0604020202020204" pitchFamily="34" charset="0"/>
+              </a:rPr>
+              <a:t>	Ponad połowa absolwentów uzyskała dyplom magistra na kierunku </a:t>
+            </a:r>
+            <a:br>
+              <a:rPr lang="pl-PL" sz="2300" dirty="0">
+                <a:latin typeface="Arial" panose="020B0604020202020204" pitchFamily="34" charset="0"/>
+                <a:cs typeface="Arial" panose="020B0604020202020204" pitchFamily="34" charset="0"/>
+              </a:rPr>
+            </a:br>
+            <a:r>
+              <a:rPr lang="pl-PL" sz="2300" dirty="0">
+                <a:latin typeface="Arial" panose="020B0604020202020204" pitchFamily="34" charset="0"/>
+                <a:cs typeface="Arial" panose="020B0604020202020204" pitchFamily="34" charset="0"/>
+              </a:rPr>
+              <a:t>w dziedzinie nauk społecznych. Innymi popularnymi kierunkami były kierunki związane z nowoczesnymi technologiami, medyczne i humanistyczne.</a:t>
+            </a:r>
+            <a:endParaRPr lang="pl-PL" sz="2300" dirty="0">
+              <a:solidFill>
+                <a:schemeClr val="accent4"/>
+              </a:solidFill>
+              <a:latin typeface="Arial" panose="020B0604020202020204" pitchFamily="34" charset="0"/>
+              <a:cs typeface="Arial" panose="020B0604020202020204" pitchFamily="34" charset="0"/>
+            </a:endParaRPr>
+          </a:p>
+        </p:txBody>
+      </p:sp>
+      <p:sp>
+        <p:nvSpPr>
+          <p:cNvPr id="7" name="Symbol zastępczy zawartości 12">
+            <a:extLst>
+              <a:ext uri="{FF2B5EF4-FFF2-40B4-BE49-F238E27FC236}">
+                <a16:creationId xmlns:a16="http://schemas.microsoft.com/office/drawing/2014/main" id="{28670177-31EF-45B8-9694-7BE806BE5EC0}"/>
+              </a:ext>
+            </a:extLst>
+          </p:cNvPr>
+          <p:cNvSpPr txBox="1">
+            <a:spLocks/>
+          </p:cNvSpPr>
+          <p:nvPr/>
+        </p:nvSpPr>
+        <p:spPr>
+          <a:xfrm>
+            <a:off x="0" y="6260951"/>
+            <a:ext cx="12192000" cy="417047"/>
+          </a:xfrm>
+          <a:prstGeom prst="rect">
+            <a:avLst/>
+          </a:prstGeom>
+        </p:spPr>
+        <p:txBody>
+          <a:bodyPr vert="horz" lIns="91440" tIns="45720" rIns="91440" bIns="45720" rtlCol="0">
+            <a:normAutofit/>
+          </a:bodyPr>
+          <a:lstStyle>
+            <a:lvl1pPr marL="228600" indent="-228600" algn="l" defTabSz="914400" rtl="0" eaLnBrk="1" latinLnBrk="0" hangingPunct="1">
+              <a:lnSpc>
+                <a:spcPct val="90000"/>
+              </a:lnSpc>
+              <a:spcBef>
+                <a:spcPts val="1000"/>
+              </a:spcBef>
+              <a:buFont typeface="Arial" panose="020B0604020202020204" pitchFamily="34" charset="0"/>
+              <a:buChar char="•"/>
+              <a:defRPr sz="2800" kern="1200">
+                <a:solidFill>
+                  <a:schemeClr val="tx1"/>
+                </a:solidFill>
+                <a:latin typeface="+mn-lt"/>
+                <a:ea typeface="+mn-ea"/>
+                <a:cs typeface="+mn-cs"/>
+              </a:defRPr>
+            </a:lvl1pPr>
+            <a:lvl2pPr marL="685800" indent="-228600" algn="l" defTabSz="914400" rtl="0" eaLnBrk="1" latinLnBrk="0" hangingPunct="1">
+              <a:lnSpc>
+                <a:spcPct val="90000"/>
+              </a:lnSpc>
+              <a:spcBef>
+                <a:spcPts val="500"/>
+              </a:spcBef>
+              <a:buFont typeface="Arial" panose="020B0604020202020204" pitchFamily="34" charset="0"/>
+              <a:buChar char="•"/>
+              <a:defRPr sz="2400" kern="1200">
+                <a:solidFill>
+                  <a:schemeClr val="tx1"/>
+                </a:solidFill>
+                <a:latin typeface="+mn-lt"/>
+                <a:ea typeface="+mn-ea"/>
+                <a:cs typeface="+mn-cs"/>
+              </a:defRPr>
+            </a:lvl2pPr>
+            <a:lvl3pPr marL="1143000" indent="-228600" algn="l" defTabSz="914400" rtl="0" eaLnBrk="1" latinLnBrk="0" hangingPunct="1">
+              <a:lnSpc>
+                <a:spcPct val="90000"/>
+              </a:lnSpc>
+              <a:spcBef>
+                <a:spcPts val="500"/>
+              </a:spcBef>
+              <a:buFont typeface="Arial" panose="020B0604020202020204" pitchFamily="34" charset="0"/>
+              <a:buChar char="•"/>
+              <a:defRPr sz="2000" kern="1200">
+                <a:solidFill>
+                  <a:schemeClr val="tx1"/>
+                </a:solidFill>
+                <a:latin typeface="+mn-lt"/>
+                <a:ea typeface="+mn-ea"/>
+                <a:cs typeface="+mn-cs"/>
+              </a:defRPr>
+            </a:lvl3pPr>
+            <a:lvl4pPr marL="1600200" indent="-228600" algn="l" defTabSz="914400" rtl="0" eaLnBrk="1" latinLnBrk="0" hangingPunct="1">
+              <a:lnSpc>
+                <a:spcPct val="90000"/>
+              </a:lnSpc>
+              <a:spcBef>
+                <a:spcPts val="500"/>
+              </a:spcBef>
+              <a:buFont typeface="Arial" panose="020B0604020202020204" pitchFamily="34" charset="0"/>
+              <a:buChar char="•"/>
+              <a:defRPr sz="1800" kern="1200">
+                <a:solidFill>
+                  <a:schemeClr val="tx1"/>
+                </a:solidFill>
+                <a:latin typeface="+mn-lt"/>
+                <a:ea typeface="+mn-ea"/>
+                <a:cs typeface="+mn-cs"/>
+              </a:defRPr>
+            </a:lvl4pPr>
+            <a:lvl5pPr marL="2057400" indent="-228600" algn="l" defTabSz="914400" rtl="0" eaLnBrk="1" latinLnBrk="0" hangingPunct="1">
+              <a:lnSpc>
+                <a:spcPct val="90000"/>
+              </a:lnSpc>
+              <a:spcBef>
+                <a:spcPts val="500"/>
+              </a:spcBef>
+              <a:buFont typeface="Arial" panose="020B0604020202020204" pitchFamily="34" charset="0"/>
+              <a:buChar char="•"/>
+              <a:defRPr sz="1800" kern="1200">
+                <a:solidFill>
+                  <a:schemeClr val="tx1"/>
+                </a:solidFill>
+                <a:latin typeface="+mn-lt"/>
+                <a:ea typeface="+mn-ea"/>
+                <a:cs typeface="+mn-cs"/>
+              </a:defRPr>
+            </a:lvl5pPr>
+            <a:lvl6pPr marL="2514600" indent="-228600" algn="l" defTabSz="914400" rtl="0" eaLnBrk="1" latinLnBrk="0" hangingPunct="1">
+              <a:lnSpc>
+                <a:spcPct val="90000"/>
+              </a:lnSpc>
+              <a:spcBef>
+                <a:spcPts val="500"/>
+              </a:spcBef>
+              <a:buFont typeface="Arial" panose="020B0604020202020204" pitchFamily="34" charset="0"/>
+              <a:buChar char="•"/>
+              <a:defRPr sz="1800" kern="1200">
+                <a:solidFill>
+                  <a:schemeClr val="tx1"/>
+                </a:solidFill>
+                <a:latin typeface="+mn-lt"/>
+                <a:ea typeface="+mn-ea"/>
+                <a:cs typeface="+mn-cs"/>
+              </a:defRPr>
+            </a:lvl6pPr>
+            <a:lvl7pPr marL="2971800" indent="-228600" algn="l" defTabSz="914400" rtl="0" eaLnBrk="1" latinLnBrk="0" hangingPunct="1">
+              <a:lnSpc>
+                <a:spcPct val="90000"/>
+              </a:lnSpc>
+              <a:spcBef>
+                <a:spcPts val="500"/>
+              </a:spcBef>
+              <a:buFont typeface="Arial" panose="020B0604020202020204" pitchFamily="34" charset="0"/>
+              <a:buChar char="•"/>
+              <a:defRPr sz="1800" kern="1200">
+                <a:solidFill>
+                  <a:schemeClr val="tx1"/>
+                </a:solidFill>
+                <a:latin typeface="+mn-lt"/>
+                <a:ea typeface="+mn-ea"/>
+                <a:cs typeface="+mn-cs"/>
+              </a:defRPr>
+            </a:lvl7pPr>
+            <a:lvl8pPr marL="3429000" indent="-228600" algn="l" defTabSz="914400" rtl="0" eaLnBrk="1" latinLnBrk="0" hangingPunct="1">
+              <a:lnSpc>
+                <a:spcPct val="90000"/>
+              </a:lnSpc>
+              <a:spcBef>
+                <a:spcPts val="500"/>
+              </a:spcBef>
+              <a:buFont typeface="Arial" panose="020B0604020202020204" pitchFamily="34" charset="0"/>
+              <a:buChar char="•"/>
+              <a:defRPr sz="1800" kern="1200">
+                <a:solidFill>
+                  <a:schemeClr val="tx1"/>
+                </a:solidFill>
+                <a:latin typeface="+mn-lt"/>
+                <a:ea typeface="+mn-ea"/>
+                <a:cs typeface="+mn-cs"/>
+              </a:defRPr>
+            </a:lvl8pPr>
+            <a:lvl9pPr marL="3886200" indent="-228600" algn="l" defTabSz="914400" rtl="0" eaLnBrk="1" latinLnBrk="0" hangingPunct="1">
+              <a:lnSpc>
+                <a:spcPct val="90000"/>
+              </a:lnSpc>
+              <a:spcBef>
+                <a:spcPts val="500"/>
+              </a:spcBef>
+              <a:buFont typeface="Arial" panose="020B0604020202020204" pitchFamily="34" charset="0"/>
+              <a:buChar char="•"/>
+              <a:defRPr sz="1800" kern="1200">
+                <a:solidFill>
+                  <a:schemeClr val="tx1"/>
+                </a:solidFill>
+                <a:latin typeface="+mn-lt"/>
+                <a:ea typeface="+mn-ea"/>
+                <a:cs typeface="+mn-cs"/>
+              </a:defRPr>
+            </a:lvl9pPr>
+          </a:lstStyle>
+          <a:p>
+            <a:pPr marL="0" indent="0" algn="ctr">
+              <a:buFont typeface="Arial" panose="020B0604020202020204" pitchFamily="34" charset="0"/>
+              <a:buNone/>
+            </a:pPr>
+            <a:r>
+              <a:rPr lang="pl-PL" sz="2000" dirty="0">
+                <a:latin typeface="Arial" panose="020B0604020202020204" pitchFamily="34" charset="0"/>
+                <a:cs typeface="Arial" panose="020B0604020202020204" pitchFamily="34" charset="0"/>
+              </a:rPr>
+              <a:t>2</a:t>
+            </a:r>
+            <a:endParaRPr lang="pl-PL" sz="1800" dirty="0">
+              <a:latin typeface="Arial" panose="020B0604020202020204" pitchFamily="34" charset="0"/>
+              <a:cs typeface="Arial" panose="020B0604020202020204" pitchFamily="34" charset="0"/>
+            </a:endParaRPr>
+          </a:p>
+        </p:txBody>
+      </p:sp>
+      <p:pic>
+        <p:nvPicPr>
+          <p:cNvPr id="24" name="Obraz 23">
+            <a:extLst>
+              <a:ext uri="{FF2B5EF4-FFF2-40B4-BE49-F238E27FC236}">
+                <a16:creationId xmlns:a16="http://schemas.microsoft.com/office/drawing/2014/main" id="{A12D4AA6-AC26-4312-BEC0-646E19AEA275}"/>
+              </a:ext>
+            </a:extLst>
+          </p:cNvPr>
+          <p:cNvPicPr>
+            <a:picLocks noChangeAspect="1"/>
+          </p:cNvPicPr>
+          <p:nvPr/>
+        </p:nvPicPr>
+        <p:blipFill>
+          <a:blip r:embed="rId2">
+            <a:extLst>
+              <a:ext uri="{28A0092B-C50C-407E-A947-70E740481C1C}">
+                <a14:useLocalDpi xmlns:a14="http://schemas.microsoft.com/office/drawing/2010/main" val="0"/>
+              </a:ext>
+            </a:extLst>
+          </a:blip>
+          <a:stretch>
+            <a:fillRect/>
+          </a:stretch>
+        </p:blipFill>
+        <p:spPr>
+          <a:xfrm>
+            <a:off x="1046827" y="2275173"/>
+            <a:ext cx="10098345" cy="4101703"/>
+          </a:xfrm>
+          <a:prstGeom prst="rect">
+            <a:avLst/>
+          </a:prstGeom>
+        </p:spPr>
+      </p:pic>
+    </p:spTree>
+    <p:extLst>
+      <p:ext uri="{BB962C8B-B14F-4D97-AF65-F5344CB8AC3E}">
+        <p14:creationId xmlns:p14="http://schemas.microsoft.com/office/powerpoint/2010/main" val="917658979"/>
+      </p:ext>
+    </p:extLst>
+  </p:cSld>
+  <p:clrMapOvr>
+    <a:masterClrMapping/>
+  </p:clrMapOvr>
+</p:sld>
+</file>
+
+<file path=ppt/slides/slide4.xml><?xml version="1.0" encoding="utf-8"?>
+<p:sld xmlns:a="http://schemas.openxmlformats.org/drawingml/2006/main" xmlns:r="http://schemas.openxmlformats.org/officeDocument/2006/relationships" xmlns:p="http://schemas.openxmlformats.org/presentationml/2006/main">
+  <p:cSld>
+    <p:bg>
+      <p:bgPr>
+        <a:solidFill>
+          <a:srgbClr val="EFEDEF"/>
+        </a:solidFill>
+        <a:effectLst/>
+      </p:bgPr>
+    </p:bg>
+    <p:spTree>
+      <p:nvGrpSpPr>
+        <p:cNvPr id="1" name=""/>
+        <p:cNvGrpSpPr/>
+        <p:nvPr/>
+      </p:nvGrpSpPr>
+      <p:grpSpPr>
+        <a:xfrm>
+          <a:off x="0" y="0"/>
+          <a:ext cx="0" cy="0"/>
+          <a:chOff x="0" y="0"/>
+          <a:chExt cx="0" cy="0"/>
+        </a:xfrm>
+      </p:grpSpPr>
+      <p:sp>
+        <p:nvSpPr>
+          <p:cNvPr id="11" name="Tytuł 10">
+            <a:extLst>
+              <a:ext uri="{FF2B5EF4-FFF2-40B4-BE49-F238E27FC236}">
+                <a16:creationId xmlns:a16="http://schemas.microsoft.com/office/drawing/2014/main" id="{E6572A4F-AEE0-4C43-A19A-0A4EFDB11758}"/>
+              </a:ext>
+            </a:extLst>
+          </p:cNvPr>
+          <p:cNvSpPr>
+            <a:spLocks noGrp="1"/>
+          </p:cNvSpPr>
+          <p:nvPr>
+            <p:ph type="title"/>
+          </p:nvPr>
+        </p:nvSpPr>
+        <p:spPr>
+          <a:xfrm>
+            <a:off x="0" y="180001"/>
+            <a:ext cx="12192000" cy="758980"/>
+          </a:xfrm>
+        </p:spPr>
+        <p:txBody>
+          <a:bodyPr>
+            <a:normAutofit/>
+          </a:bodyPr>
+          <a:lstStyle/>
+          <a:p>
+            <a:pPr marL="1080000"/>
+            <a:r>
+              <a:rPr lang="pl-PL" sz="4000" dirty="0">
+                <a:solidFill>
+                  <a:srgbClr val="002060"/>
+                </a:solidFill>
+                <a:latin typeface="Arial" panose="020B0604020202020204" pitchFamily="34" charset="0"/>
+                <a:cs typeface="Arial" panose="020B0604020202020204" pitchFamily="34" charset="0"/>
+              </a:rPr>
+              <a:t>Dziedzina i forma studiów</a:t>
+            </a:r>
+          </a:p>
+        </p:txBody>
+      </p:sp>
+      <p:sp>
+        <p:nvSpPr>
+          <p:cNvPr id="13" name="Symbol zastępczy zawartości 12">
+            <a:extLst>
+              <a:ext uri="{FF2B5EF4-FFF2-40B4-BE49-F238E27FC236}">
+                <a16:creationId xmlns:a16="http://schemas.microsoft.com/office/drawing/2014/main" id="{DA401464-8C74-4E2C-AA34-162A596EE429}"/>
+              </a:ext>
+            </a:extLst>
+          </p:cNvPr>
+          <p:cNvSpPr>
+            <a:spLocks noGrp="1"/>
+          </p:cNvSpPr>
+          <p:nvPr>
+            <p:ph idx="1"/>
+          </p:nvPr>
+        </p:nvSpPr>
+        <p:spPr>
+          <a:xfrm>
+            <a:off x="0" y="1237130"/>
+            <a:ext cx="11112000" cy="4528970"/>
+          </a:xfrm>
+        </p:spPr>
+        <p:txBody>
+          <a:bodyPr>
+            <a:normAutofit/>
+          </a:bodyPr>
+          <a:lstStyle/>
+          <a:p>
+            <a:pPr marL="1080000" indent="0" algn="just">
+              <a:buNone/>
+            </a:pPr>
+            <a:r>
+              <a:rPr lang="pl-PL" sz="2300" dirty="0">
+                <a:latin typeface="Arial" panose="020B0604020202020204" pitchFamily="34" charset="0"/>
+                <a:cs typeface="Arial" panose="020B0604020202020204" pitchFamily="34" charset="0"/>
+              </a:rPr>
+              <a:t>	Ponad połowa badanych studentów ukończyła studia magisterskie </a:t>
+            </a:r>
+            <a:br>
+              <a:rPr lang="pl-PL" sz="2300" dirty="0">
+                <a:latin typeface="Arial" panose="020B0604020202020204" pitchFamily="34" charset="0"/>
+                <a:cs typeface="Arial" panose="020B0604020202020204" pitchFamily="34" charset="0"/>
+              </a:rPr>
+            </a:br>
+            <a:r>
+              <a:rPr lang="pl-PL" sz="2300" dirty="0">
+                <a:latin typeface="Arial" panose="020B0604020202020204" pitchFamily="34" charset="0"/>
+                <a:cs typeface="Arial" panose="020B0604020202020204" pitchFamily="34" charset="0"/>
+              </a:rPr>
+              <a:t>na kierunku odbywającym się w formie stacjonarnej.</a:t>
+            </a:r>
+          </a:p>
+        </p:txBody>
+      </p:sp>
+      <p:sp>
+        <p:nvSpPr>
+          <p:cNvPr id="7" name="Symbol zastępczy zawartości 12">
+            <a:extLst>
+              <a:ext uri="{FF2B5EF4-FFF2-40B4-BE49-F238E27FC236}">
+                <a16:creationId xmlns:a16="http://schemas.microsoft.com/office/drawing/2014/main" id="{28670177-31EF-45B8-9694-7BE806BE5EC0}"/>
+              </a:ext>
+            </a:extLst>
+          </p:cNvPr>
+          <p:cNvSpPr txBox="1">
+            <a:spLocks/>
+          </p:cNvSpPr>
+          <p:nvPr/>
+        </p:nvSpPr>
+        <p:spPr>
+          <a:xfrm>
+            <a:off x="0" y="6260951"/>
+            <a:ext cx="12192000" cy="417047"/>
+          </a:xfrm>
+          <a:prstGeom prst="rect">
+            <a:avLst/>
+          </a:prstGeom>
+        </p:spPr>
+        <p:txBody>
+          <a:bodyPr vert="horz" lIns="91440" tIns="45720" rIns="91440" bIns="45720" rtlCol="0">
+            <a:normAutofit/>
+          </a:bodyPr>
+          <a:lstStyle>
+            <a:lvl1pPr marL="228600" indent="-228600" algn="l" defTabSz="914400" rtl="0" eaLnBrk="1" latinLnBrk="0" hangingPunct="1">
+              <a:lnSpc>
+                <a:spcPct val="90000"/>
+              </a:lnSpc>
+              <a:spcBef>
+                <a:spcPts val="1000"/>
+              </a:spcBef>
+              <a:buFont typeface="Arial" panose="020B0604020202020204" pitchFamily="34" charset="0"/>
+              <a:buChar char="•"/>
+              <a:defRPr sz="2800" kern="1200">
+                <a:solidFill>
+                  <a:schemeClr val="tx1"/>
+                </a:solidFill>
+                <a:latin typeface="+mn-lt"/>
+                <a:ea typeface="+mn-ea"/>
+                <a:cs typeface="+mn-cs"/>
+              </a:defRPr>
+            </a:lvl1pPr>
+            <a:lvl2pPr marL="685800" indent="-228600" algn="l" defTabSz="914400" rtl="0" eaLnBrk="1" latinLnBrk="0" hangingPunct="1">
+              <a:lnSpc>
+                <a:spcPct val="90000"/>
+              </a:lnSpc>
+              <a:spcBef>
+                <a:spcPts val="500"/>
+              </a:spcBef>
+              <a:buFont typeface="Arial" panose="020B0604020202020204" pitchFamily="34" charset="0"/>
+              <a:buChar char="•"/>
+              <a:defRPr sz="2400" kern="1200">
+                <a:solidFill>
+                  <a:schemeClr val="tx1"/>
+                </a:solidFill>
+                <a:latin typeface="+mn-lt"/>
+                <a:ea typeface="+mn-ea"/>
+                <a:cs typeface="+mn-cs"/>
+              </a:defRPr>
+            </a:lvl2pPr>
+            <a:lvl3pPr marL="1143000" indent="-228600" algn="l" defTabSz="914400" rtl="0" eaLnBrk="1" latinLnBrk="0" hangingPunct="1">
+              <a:lnSpc>
+                <a:spcPct val="90000"/>
+              </a:lnSpc>
+              <a:spcBef>
+                <a:spcPts val="500"/>
+              </a:spcBef>
+              <a:buFont typeface="Arial" panose="020B0604020202020204" pitchFamily="34" charset="0"/>
+              <a:buChar char="•"/>
+              <a:defRPr sz="2000" kern="1200">
+                <a:solidFill>
+                  <a:schemeClr val="tx1"/>
+                </a:solidFill>
+                <a:latin typeface="+mn-lt"/>
+                <a:ea typeface="+mn-ea"/>
+                <a:cs typeface="+mn-cs"/>
+              </a:defRPr>
+            </a:lvl3pPr>
+            <a:lvl4pPr marL="1600200" indent="-228600" algn="l" defTabSz="914400" rtl="0" eaLnBrk="1" latinLnBrk="0" hangingPunct="1">
+              <a:lnSpc>
+                <a:spcPct val="90000"/>
+              </a:lnSpc>
+              <a:spcBef>
+                <a:spcPts val="500"/>
+              </a:spcBef>
+              <a:buFont typeface="Arial" panose="020B0604020202020204" pitchFamily="34" charset="0"/>
+              <a:buChar char="•"/>
+              <a:defRPr sz="1800" kern="1200">
+                <a:solidFill>
+                  <a:schemeClr val="tx1"/>
+                </a:solidFill>
+                <a:latin typeface="+mn-lt"/>
+                <a:ea typeface="+mn-ea"/>
+                <a:cs typeface="+mn-cs"/>
+              </a:defRPr>
+            </a:lvl4pPr>
+            <a:lvl5pPr marL="2057400" indent="-228600" algn="l" defTabSz="914400" rtl="0" eaLnBrk="1" latinLnBrk="0" hangingPunct="1">
+              <a:lnSpc>
+                <a:spcPct val="90000"/>
+              </a:lnSpc>
+              <a:spcBef>
+                <a:spcPts val="500"/>
+              </a:spcBef>
+              <a:buFont typeface="Arial" panose="020B0604020202020204" pitchFamily="34" charset="0"/>
+              <a:buChar char="•"/>
+              <a:defRPr sz="1800" kern="1200">
+                <a:solidFill>
+                  <a:schemeClr val="tx1"/>
+                </a:solidFill>
+                <a:latin typeface="+mn-lt"/>
+                <a:ea typeface="+mn-ea"/>
+                <a:cs typeface="+mn-cs"/>
+              </a:defRPr>
+            </a:lvl5pPr>
+            <a:lvl6pPr marL="2514600" indent="-228600" algn="l" defTabSz="914400" rtl="0" eaLnBrk="1" latinLnBrk="0" hangingPunct="1">
+              <a:lnSpc>
+                <a:spcPct val="90000"/>
+              </a:lnSpc>
+              <a:spcBef>
+                <a:spcPts val="500"/>
+              </a:spcBef>
+              <a:buFont typeface="Arial" panose="020B0604020202020204" pitchFamily="34" charset="0"/>
+              <a:buChar char="•"/>
+              <a:defRPr sz="1800" kern="1200">
+                <a:solidFill>
+                  <a:schemeClr val="tx1"/>
+                </a:solidFill>
+                <a:latin typeface="+mn-lt"/>
+                <a:ea typeface="+mn-ea"/>
+                <a:cs typeface="+mn-cs"/>
+              </a:defRPr>
+            </a:lvl6pPr>
+            <a:lvl7pPr marL="2971800" indent="-228600" algn="l" defTabSz="914400" rtl="0" eaLnBrk="1" latinLnBrk="0" hangingPunct="1">
+              <a:lnSpc>
+                <a:spcPct val="90000"/>
+              </a:lnSpc>
+              <a:spcBef>
+                <a:spcPts val="500"/>
+              </a:spcBef>
+              <a:buFont typeface="Arial" panose="020B0604020202020204" pitchFamily="34" charset="0"/>
+              <a:buChar char="•"/>
+              <a:defRPr sz="1800" kern="1200">
+                <a:solidFill>
+                  <a:schemeClr val="tx1"/>
+                </a:solidFill>
+                <a:latin typeface="+mn-lt"/>
+                <a:ea typeface="+mn-ea"/>
+                <a:cs typeface="+mn-cs"/>
+              </a:defRPr>
+            </a:lvl7pPr>
+            <a:lvl8pPr marL="3429000" indent="-228600" algn="l" defTabSz="914400" rtl="0" eaLnBrk="1" latinLnBrk="0" hangingPunct="1">
+              <a:lnSpc>
+                <a:spcPct val="90000"/>
+              </a:lnSpc>
+              <a:spcBef>
+                <a:spcPts val="500"/>
+              </a:spcBef>
+              <a:buFont typeface="Arial" panose="020B0604020202020204" pitchFamily="34" charset="0"/>
+              <a:buChar char="•"/>
+              <a:defRPr sz="1800" kern="1200">
+                <a:solidFill>
+                  <a:schemeClr val="tx1"/>
+                </a:solidFill>
+                <a:latin typeface="+mn-lt"/>
+                <a:ea typeface="+mn-ea"/>
+                <a:cs typeface="+mn-cs"/>
+              </a:defRPr>
+            </a:lvl8pPr>
+            <a:lvl9pPr marL="3886200" indent="-228600" algn="l" defTabSz="914400" rtl="0" eaLnBrk="1" latinLnBrk="0" hangingPunct="1">
+              <a:lnSpc>
+                <a:spcPct val="90000"/>
+              </a:lnSpc>
+              <a:spcBef>
+                <a:spcPts val="500"/>
+              </a:spcBef>
+              <a:buFont typeface="Arial" panose="020B0604020202020204" pitchFamily="34" charset="0"/>
+              <a:buChar char="•"/>
+              <a:defRPr sz="1800" kern="1200">
+                <a:solidFill>
+                  <a:schemeClr val="tx1"/>
+                </a:solidFill>
+                <a:latin typeface="+mn-lt"/>
+                <a:ea typeface="+mn-ea"/>
+                <a:cs typeface="+mn-cs"/>
+              </a:defRPr>
+            </a:lvl9pPr>
+          </a:lstStyle>
+          <a:p>
+            <a:pPr marL="0" indent="0" algn="ctr">
+              <a:buFont typeface="Arial" panose="020B0604020202020204" pitchFamily="34" charset="0"/>
+              <a:buNone/>
+            </a:pPr>
+            <a:r>
+              <a:rPr lang="pl-PL" sz="2000" dirty="0">
+                <a:latin typeface="Arial" panose="020B0604020202020204" pitchFamily="34" charset="0"/>
+                <a:cs typeface="Arial" panose="020B0604020202020204" pitchFamily="34" charset="0"/>
+              </a:rPr>
+              <a:t>3</a:t>
+            </a:r>
+            <a:endParaRPr lang="pl-PL" sz="1800" dirty="0">
+              <a:latin typeface="Arial" panose="020B0604020202020204" pitchFamily="34" charset="0"/>
+              <a:cs typeface="Arial" panose="020B0604020202020204" pitchFamily="34" charset="0"/>
+            </a:endParaRPr>
+          </a:p>
+        </p:txBody>
+      </p:sp>
+      <p:pic>
+        <p:nvPicPr>
+          <p:cNvPr id="22" name="Obraz 21">
+            <a:extLst>
+              <a:ext uri="{FF2B5EF4-FFF2-40B4-BE49-F238E27FC236}">
+                <a16:creationId xmlns:a16="http://schemas.microsoft.com/office/drawing/2014/main" id="{FEE9E55E-7EC3-4B65-970D-0441DFBCA3D8}"/>
+              </a:ext>
+            </a:extLst>
+          </p:cNvPr>
+          <p:cNvPicPr>
+            <a:picLocks noChangeAspect="1"/>
+          </p:cNvPicPr>
+          <p:nvPr/>
+        </p:nvPicPr>
+        <p:blipFill>
+          <a:blip r:embed="rId2">
+            <a:extLst>
+              <a:ext uri="{28A0092B-C50C-407E-A947-70E740481C1C}">
+                <a14:useLocalDpi xmlns:a14="http://schemas.microsoft.com/office/drawing/2010/main" val="0"/>
+              </a:ext>
+            </a:extLst>
+          </a:blip>
+          <a:stretch>
+            <a:fillRect/>
+          </a:stretch>
+        </p:blipFill>
+        <p:spPr>
+          <a:xfrm>
+            <a:off x="3099707" y="2197545"/>
+            <a:ext cx="5992585" cy="4063406"/>
+          </a:xfrm>
+          <a:prstGeom prst="rect">
+            <a:avLst/>
+          </a:prstGeom>
+        </p:spPr>
+      </p:pic>
+    </p:spTree>
+    <p:extLst>
+      <p:ext uri="{BB962C8B-B14F-4D97-AF65-F5344CB8AC3E}">
+        <p14:creationId xmlns:p14="http://schemas.microsoft.com/office/powerpoint/2010/main" val="2745133864"/>
+      </p:ext>
+    </p:extLst>
+  </p:cSld>
+  <p:clrMapOvr>
+    <a:masterClrMapping/>
+  </p:clrMapOvr>
+</p:sld>
+</file>
+
+<file path=ppt/slides/slide5.xml><?xml version="1.0" encoding="utf-8"?>
+<p:sld xmlns:a="http://schemas.openxmlformats.org/drawingml/2006/main" xmlns:r="http://schemas.openxmlformats.org/officeDocument/2006/relationships" xmlns:p="http://schemas.openxmlformats.org/presentationml/2006/main">
+  <p:cSld>
+    <p:bg>
+      <p:bgPr>
+        <a:solidFill>
+          <a:srgbClr val="EFEDEF"/>
+        </a:solidFill>
+        <a:effectLst/>
+      </p:bgPr>
+    </p:bg>
+    <p:spTree>
+      <p:nvGrpSpPr>
+        <p:cNvPr id="1" name=""/>
+        <p:cNvGrpSpPr/>
+        <p:nvPr/>
+      </p:nvGrpSpPr>
+      <p:grpSpPr>
+        <a:xfrm>
+          <a:off x="0" y="0"/>
+          <a:ext cx="0" cy="0"/>
+          <a:chOff x="0" y="0"/>
+          <a:chExt cx="0" cy="0"/>
+        </a:xfrm>
+      </p:grpSpPr>
+      <p:sp>
+        <p:nvSpPr>
+          <p:cNvPr id="11" name="Tytuł 10">
+            <a:extLst>
+              <a:ext uri="{FF2B5EF4-FFF2-40B4-BE49-F238E27FC236}">
+                <a16:creationId xmlns:a16="http://schemas.microsoft.com/office/drawing/2014/main" id="{E6572A4F-AEE0-4C43-A19A-0A4EFDB11758}"/>
+              </a:ext>
+            </a:extLst>
+          </p:cNvPr>
+          <p:cNvSpPr>
+            <a:spLocks noGrp="1"/>
+          </p:cNvSpPr>
+          <p:nvPr>
+            <p:ph type="title"/>
+          </p:nvPr>
+        </p:nvSpPr>
+        <p:spPr>
+          <a:xfrm>
+            <a:off x="0" y="180001"/>
+            <a:ext cx="12192000" cy="758980"/>
+          </a:xfrm>
+        </p:spPr>
+        <p:txBody>
+          <a:bodyPr>
+            <a:normAutofit/>
+          </a:bodyPr>
+          <a:lstStyle/>
+          <a:p>
+            <a:pPr marL="1080000"/>
+            <a:r>
+              <a:rPr lang="pl-PL" sz="4000" dirty="0">
+                <a:solidFill>
+                  <a:srgbClr val="002060"/>
+                </a:solidFill>
+                <a:latin typeface="Arial" panose="020B0604020202020204" pitchFamily="34" charset="0"/>
+                <a:cs typeface="Arial" panose="020B0604020202020204" pitchFamily="34" charset="0"/>
+              </a:rPr>
+              <a:t>Dziedzina i forma studiów</a:t>
+            </a:r>
+          </a:p>
+        </p:txBody>
+      </p:sp>
+      <p:sp>
+        <p:nvSpPr>
+          <p:cNvPr id="13" name="Symbol zastępczy zawartości 12">
+            <a:extLst>
+              <a:ext uri="{FF2B5EF4-FFF2-40B4-BE49-F238E27FC236}">
+                <a16:creationId xmlns:a16="http://schemas.microsoft.com/office/drawing/2014/main" id="{DA401464-8C74-4E2C-AA34-162A596EE429}"/>
+              </a:ext>
+            </a:extLst>
+          </p:cNvPr>
+          <p:cNvSpPr>
+            <a:spLocks noGrp="1"/>
+          </p:cNvSpPr>
+          <p:nvPr>
+            <p:ph idx="1"/>
+          </p:nvPr>
+        </p:nvSpPr>
+        <p:spPr>
+          <a:xfrm>
+            <a:off x="0" y="1237130"/>
+            <a:ext cx="11112000" cy="4528970"/>
+          </a:xfrm>
+        </p:spPr>
+        <p:txBody>
+          <a:bodyPr>
+            <a:normAutofit/>
+          </a:bodyPr>
+          <a:lstStyle/>
+          <a:p>
+            <a:pPr marL="1080000" indent="0" algn="just">
+              <a:buNone/>
+            </a:pPr>
+            <a:r>
+              <a:rPr lang="pl-PL" sz="2300">
+                <a:latin typeface="Arial" panose="020B0604020202020204" pitchFamily="34" charset="0"/>
+                <a:cs typeface="Arial" panose="020B0604020202020204" pitchFamily="34" charset="0"/>
+              </a:rPr>
+              <a:t>	Ponad</a:t>
+            </a:r>
+            <a:endParaRPr lang="pl-PL" sz="2300" dirty="0">
+              <a:solidFill>
+                <a:schemeClr val="accent4"/>
+              </a:solidFill>
+              <a:latin typeface="Arial" panose="020B0604020202020204" pitchFamily="34" charset="0"/>
+              <a:cs typeface="Arial" panose="020B0604020202020204" pitchFamily="34" charset="0"/>
+            </a:endParaRPr>
+          </a:p>
+        </p:txBody>
+      </p:sp>
+      <p:sp>
+        <p:nvSpPr>
+          <p:cNvPr id="7" name="Symbol zastępczy zawartości 12">
+            <a:extLst>
+              <a:ext uri="{FF2B5EF4-FFF2-40B4-BE49-F238E27FC236}">
+                <a16:creationId xmlns:a16="http://schemas.microsoft.com/office/drawing/2014/main" id="{28670177-31EF-45B8-9694-7BE806BE5EC0}"/>
+              </a:ext>
+            </a:extLst>
+          </p:cNvPr>
+          <p:cNvSpPr txBox="1">
+            <a:spLocks/>
+          </p:cNvSpPr>
+          <p:nvPr/>
+        </p:nvSpPr>
+        <p:spPr>
+          <a:xfrm>
+            <a:off x="0" y="6260951"/>
+            <a:ext cx="12192000" cy="417047"/>
+          </a:xfrm>
+          <a:prstGeom prst="rect">
+            <a:avLst/>
+          </a:prstGeom>
+        </p:spPr>
+        <p:txBody>
+          <a:bodyPr vert="horz" lIns="91440" tIns="45720" rIns="91440" bIns="45720" rtlCol="0">
+            <a:normAutofit/>
+          </a:bodyPr>
+          <a:lstStyle>
+            <a:lvl1pPr marL="228600" indent="-228600" algn="l" defTabSz="914400" rtl="0" eaLnBrk="1" latinLnBrk="0" hangingPunct="1">
+              <a:lnSpc>
+                <a:spcPct val="90000"/>
+              </a:lnSpc>
+              <a:spcBef>
+                <a:spcPts val="1000"/>
+              </a:spcBef>
+              <a:buFont typeface="Arial" panose="020B0604020202020204" pitchFamily="34" charset="0"/>
+              <a:buChar char="•"/>
+              <a:defRPr sz="2800" kern="1200">
+                <a:solidFill>
+                  <a:schemeClr val="tx1"/>
+                </a:solidFill>
+                <a:latin typeface="+mn-lt"/>
+                <a:ea typeface="+mn-ea"/>
+                <a:cs typeface="+mn-cs"/>
+              </a:defRPr>
+            </a:lvl1pPr>
+            <a:lvl2pPr marL="685800" indent="-228600" algn="l" defTabSz="914400" rtl="0" eaLnBrk="1" latinLnBrk="0" hangingPunct="1">
+              <a:lnSpc>
+                <a:spcPct val="90000"/>
+              </a:lnSpc>
+              <a:spcBef>
+                <a:spcPts val="500"/>
+              </a:spcBef>
+              <a:buFont typeface="Arial" panose="020B0604020202020204" pitchFamily="34" charset="0"/>
+              <a:buChar char="•"/>
+              <a:defRPr sz="2400" kern="1200">
+                <a:solidFill>
+                  <a:schemeClr val="tx1"/>
+                </a:solidFill>
+                <a:latin typeface="+mn-lt"/>
+                <a:ea typeface="+mn-ea"/>
+                <a:cs typeface="+mn-cs"/>
+              </a:defRPr>
+            </a:lvl2pPr>
+            <a:lvl3pPr marL="1143000" indent="-228600" algn="l" defTabSz="914400" rtl="0" eaLnBrk="1" latinLnBrk="0" hangingPunct="1">
+              <a:lnSpc>
+                <a:spcPct val="90000"/>
+              </a:lnSpc>
+              <a:spcBef>
+                <a:spcPts val="500"/>
+              </a:spcBef>
+              <a:buFont typeface="Arial" panose="020B0604020202020204" pitchFamily="34" charset="0"/>
+              <a:buChar char="•"/>
+              <a:defRPr sz="2000" kern="1200">
+                <a:solidFill>
+                  <a:schemeClr val="tx1"/>
+                </a:solidFill>
+                <a:latin typeface="+mn-lt"/>
+                <a:ea typeface="+mn-ea"/>
+                <a:cs typeface="+mn-cs"/>
+              </a:defRPr>
+            </a:lvl3pPr>
+            <a:lvl4pPr marL="1600200" indent="-228600" algn="l" defTabSz="914400" rtl="0" eaLnBrk="1" latinLnBrk="0" hangingPunct="1">
+              <a:lnSpc>
+                <a:spcPct val="90000"/>
+              </a:lnSpc>
+              <a:spcBef>
+                <a:spcPts val="500"/>
+              </a:spcBef>
+              <a:buFont typeface="Arial" panose="020B0604020202020204" pitchFamily="34" charset="0"/>
+              <a:buChar char="•"/>
+              <a:defRPr sz="1800" kern="1200">
+                <a:solidFill>
+                  <a:schemeClr val="tx1"/>
+                </a:solidFill>
+                <a:latin typeface="+mn-lt"/>
+                <a:ea typeface="+mn-ea"/>
+                <a:cs typeface="+mn-cs"/>
+              </a:defRPr>
+            </a:lvl4pPr>
+            <a:lvl5pPr marL="2057400" indent="-228600" algn="l" defTabSz="914400" rtl="0" eaLnBrk="1" latinLnBrk="0" hangingPunct="1">
+              <a:lnSpc>
+                <a:spcPct val="90000"/>
+              </a:lnSpc>
+              <a:spcBef>
+                <a:spcPts val="500"/>
+              </a:spcBef>
+              <a:buFont typeface="Arial" panose="020B0604020202020204" pitchFamily="34" charset="0"/>
+              <a:buChar char="•"/>
+              <a:defRPr sz="1800" kern="1200">
+                <a:solidFill>
+                  <a:schemeClr val="tx1"/>
+                </a:solidFill>
+                <a:latin typeface="+mn-lt"/>
+                <a:ea typeface="+mn-ea"/>
+                <a:cs typeface="+mn-cs"/>
+              </a:defRPr>
+            </a:lvl5pPr>
+            <a:lvl6pPr marL="2514600" indent="-228600" algn="l" defTabSz="914400" rtl="0" eaLnBrk="1" latinLnBrk="0" hangingPunct="1">
+              <a:lnSpc>
+                <a:spcPct val="90000"/>
+              </a:lnSpc>
+              <a:spcBef>
+                <a:spcPts val="500"/>
+              </a:spcBef>
+              <a:buFont typeface="Arial" panose="020B0604020202020204" pitchFamily="34" charset="0"/>
+              <a:buChar char="•"/>
+              <a:defRPr sz="1800" kern="1200">
+                <a:solidFill>
+                  <a:schemeClr val="tx1"/>
+                </a:solidFill>
+                <a:latin typeface="+mn-lt"/>
+                <a:ea typeface="+mn-ea"/>
+                <a:cs typeface="+mn-cs"/>
+              </a:defRPr>
+            </a:lvl6pPr>
+            <a:lvl7pPr marL="2971800" indent="-228600" algn="l" defTabSz="914400" rtl="0" eaLnBrk="1" latinLnBrk="0" hangingPunct="1">
+              <a:lnSpc>
+                <a:spcPct val="90000"/>
+              </a:lnSpc>
+              <a:spcBef>
+                <a:spcPts val="500"/>
+              </a:spcBef>
+              <a:buFont typeface="Arial" panose="020B0604020202020204" pitchFamily="34" charset="0"/>
+              <a:buChar char="•"/>
+              <a:defRPr sz="1800" kern="1200">
+                <a:solidFill>
+                  <a:schemeClr val="tx1"/>
+                </a:solidFill>
+                <a:latin typeface="+mn-lt"/>
+                <a:ea typeface="+mn-ea"/>
+                <a:cs typeface="+mn-cs"/>
+              </a:defRPr>
+            </a:lvl7pPr>
+            <a:lvl8pPr marL="3429000" indent="-228600" algn="l" defTabSz="914400" rtl="0" eaLnBrk="1" latinLnBrk="0" hangingPunct="1">
+              <a:lnSpc>
+                <a:spcPct val="90000"/>
+              </a:lnSpc>
+              <a:spcBef>
+                <a:spcPts val="500"/>
+              </a:spcBef>
+              <a:buFont typeface="Arial" panose="020B0604020202020204" pitchFamily="34" charset="0"/>
+              <a:buChar char="•"/>
+              <a:defRPr sz="1800" kern="1200">
+                <a:solidFill>
+                  <a:schemeClr val="tx1"/>
+                </a:solidFill>
+                <a:latin typeface="+mn-lt"/>
+                <a:ea typeface="+mn-ea"/>
+                <a:cs typeface="+mn-cs"/>
+              </a:defRPr>
+            </a:lvl8pPr>
+            <a:lvl9pPr marL="3886200" indent="-228600" algn="l" defTabSz="914400" rtl="0" eaLnBrk="1" latinLnBrk="0" hangingPunct="1">
+              <a:lnSpc>
+                <a:spcPct val="90000"/>
+              </a:lnSpc>
+              <a:spcBef>
+                <a:spcPts val="500"/>
+              </a:spcBef>
+              <a:buFont typeface="Arial" panose="020B0604020202020204" pitchFamily="34" charset="0"/>
+              <a:buChar char="•"/>
+              <a:defRPr sz="1800" kern="1200">
+                <a:solidFill>
+                  <a:schemeClr val="tx1"/>
+                </a:solidFill>
+                <a:latin typeface="+mn-lt"/>
+                <a:ea typeface="+mn-ea"/>
+                <a:cs typeface="+mn-cs"/>
+              </a:defRPr>
+            </a:lvl9pPr>
+          </a:lstStyle>
+          <a:p>
+            <a:pPr marL="0" indent="0" algn="ctr">
+              <a:buFont typeface="Arial" panose="020B0604020202020204" pitchFamily="34" charset="0"/>
+              <a:buNone/>
+            </a:pPr>
+            <a:r>
+              <a:rPr lang="pl-PL" sz="2000" dirty="0">
+                <a:latin typeface="Arial" panose="020B0604020202020204" pitchFamily="34" charset="0"/>
+                <a:cs typeface="Arial" panose="020B0604020202020204" pitchFamily="34" charset="0"/>
+              </a:rPr>
+              <a:t>4</a:t>
+            </a:r>
+            <a:endParaRPr lang="pl-PL" sz="1800" dirty="0">
+              <a:latin typeface="Arial" panose="020B0604020202020204" pitchFamily="34" charset="0"/>
+              <a:cs typeface="Arial" panose="020B0604020202020204" pitchFamily="34" charset="0"/>
+            </a:endParaRPr>
+          </a:p>
+        </p:txBody>
+      </p:sp>
+    </p:spTree>
+    <p:extLst>
+      <p:ext uri="{BB962C8B-B14F-4D97-AF65-F5344CB8AC3E}">
+        <p14:creationId xmlns:p14="http://schemas.microsoft.com/office/powerpoint/2010/main" val="3294513519"/>
+      </p:ext>
+    </p:extLst>
+  </p:cSld>
+  <p:clrMapOvr>
+    <a:masterClrMapping/>
+  </p:clrMapOvr>
+</p:sld>
+</file>
+
+<file path=ppt/slides/slide6.xml><?xml version="1.0" encoding="utf-8"?>
+<p:sld xmlns:a="http://schemas.openxmlformats.org/drawingml/2006/main" xmlns:r="http://schemas.openxmlformats.org/officeDocument/2006/relationships" xmlns:p="http://schemas.openxmlformats.org/presentationml/2006/main">
+  <p:cSld>
+    <p:bg>
+      <p:bgPr>
+        <a:solidFill>
+          <a:srgbClr val="EFEDEF"/>
+        </a:solidFill>
+        <a:effectLst/>
+      </p:bgPr>
+    </p:bg>
+    <p:spTree>
+      <p:nvGrpSpPr>
+        <p:cNvPr id="1" name=""/>
+        <p:cNvGrpSpPr/>
+        <p:nvPr/>
+      </p:nvGrpSpPr>
+      <p:grpSpPr>
+        <a:xfrm>
+          <a:off x="0" y="0"/>
+          <a:ext cx="0" cy="0"/>
+          <a:chOff x="0" y="0"/>
+          <a:chExt cx="0" cy="0"/>
+        </a:xfrm>
+      </p:grpSpPr>
+      <p:sp>
+        <p:nvSpPr>
+          <p:cNvPr id="11" name="Tytuł 10">
+            <a:extLst>
+              <a:ext uri="{FF2B5EF4-FFF2-40B4-BE49-F238E27FC236}">
+                <a16:creationId xmlns:a16="http://schemas.microsoft.com/office/drawing/2014/main" id="{E6572A4F-AEE0-4C43-A19A-0A4EFDB11758}"/>
+              </a:ext>
+            </a:extLst>
+          </p:cNvPr>
+          <p:cNvSpPr>
+            <a:spLocks noGrp="1"/>
+          </p:cNvSpPr>
+          <p:nvPr>
+            <p:ph type="title"/>
+          </p:nvPr>
+        </p:nvSpPr>
+        <p:spPr>
+          <a:xfrm>
+            <a:off x="0" y="180001"/>
+            <a:ext cx="12192000" cy="758980"/>
+          </a:xfrm>
+        </p:spPr>
+        <p:txBody>
+          <a:bodyPr>
+            <a:normAutofit/>
+          </a:bodyPr>
+          <a:lstStyle/>
+          <a:p>
+            <a:pPr marL="1080000"/>
+            <a:r>
+              <a:rPr lang="pl-PL" sz="4000" dirty="0">
+                <a:solidFill>
+                  <a:srgbClr val="002060"/>
+                </a:solidFill>
+                <a:latin typeface="Arial" panose="020B0604020202020204" pitchFamily="34" charset="0"/>
+                <a:cs typeface="Arial" panose="020B0604020202020204" pitchFamily="34" charset="0"/>
+              </a:rPr>
+              <a:t>Dziedzina i forma studiów</a:t>
+            </a:r>
+          </a:p>
+        </p:txBody>
+      </p:sp>
+      <p:sp>
+        <p:nvSpPr>
+          <p:cNvPr id="13" name="Symbol zastępczy zawartości 12">
+            <a:extLst>
+              <a:ext uri="{FF2B5EF4-FFF2-40B4-BE49-F238E27FC236}">
+                <a16:creationId xmlns:a16="http://schemas.microsoft.com/office/drawing/2014/main" id="{DA401464-8C74-4E2C-AA34-162A596EE429}"/>
+              </a:ext>
+            </a:extLst>
+          </p:cNvPr>
+          <p:cNvSpPr>
+            <a:spLocks noGrp="1"/>
+          </p:cNvSpPr>
+          <p:nvPr>
+            <p:ph idx="1"/>
+          </p:nvPr>
+        </p:nvSpPr>
+        <p:spPr>
+          <a:xfrm>
+            <a:off x="0" y="1237130"/>
+            <a:ext cx="11112000" cy="4528970"/>
+          </a:xfrm>
+        </p:spPr>
+        <p:txBody>
+          <a:bodyPr>
+            <a:normAutofit/>
+          </a:bodyPr>
+          <a:lstStyle/>
+          <a:p>
+            <a:pPr marL="1080000" indent="0" algn="just">
+              <a:buNone/>
+            </a:pPr>
+            <a:r>
+              <a:rPr lang="pl-PL" sz="2300" dirty="0">
+                <a:latin typeface="Arial" panose="020B0604020202020204" pitchFamily="34" charset="0"/>
+                <a:cs typeface="Arial" panose="020B0604020202020204" pitchFamily="34" charset="0"/>
+              </a:rPr>
+              <a:t>	Ponad połowa absolwentów studiów społecznych ukończyła studia </a:t>
+            </a:r>
+            <a:br>
+              <a:rPr lang="pl-PL" sz="2300" dirty="0">
+                <a:latin typeface="Arial" panose="020B0604020202020204" pitchFamily="34" charset="0"/>
+                <a:cs typeface="Arial" panose="020B0604020202020204" pitchFamily="34" charset="0"/>
+              </a:rPr>
+            </a:br>
+            <a:r>
+              <a:rPr lang="pl-PL" sz="2300" dirty="0">
+                <a:latin typeface="Arial" panose="020B0604020202020204" pitchFamily="34" charset="0"/>
+                <a:cs typeface="Arial" panose="020B0604020202020204" pitchFamily="34" charset="0"/>
+              </a:rPr>
+              <a:t>w formie niestacjonarnej i są głównymi przedstawicielami tej grupy. Znacząca większość absolwentów pozostałych kierunków uzyskała dyplom w formie stacjonarnej.</a:t>
+            </a:r>
+            <a:endParaRPr lang="pl-PL" sz="2300" dirty="0">
+              <a:solidFill>
+                <a:schemeClr val="accent4"/>
+              </a:solidFill>
+              <a:latin typeface="Arial" panose="020B0604020202020204" pitchFamily="34" charset="0"/>
+              <a:cs typeface="Arial" panose="020B0604020202020204" pitchFamily="34" charset="0"/>
+            </a:endParaRPr>
+          </a:p>
+        </p:txBody>
+      </p:sp>
+      <p:sp>
+        <p:nvSpPr>
+          <p:cNvPr id="7" name="Symbol zastępczy zawartości 12">
+            <a:extLst>
+              <a:ext uri="{FF2B5EF4-FFF2-40B4-BE49-F238E27FC236}">
+                <a16:creationId xmlns:a16="http://schemas.microsoft.com/office/drawing/2014/main" id="{28670177-31EF-45B8-9694-7BE806BE5EC0}"/>
+              </a:ext>
+            </a:extLst>
+          </p:cNvPr>
+          <p:cNvSpPr txBox="1">
+            <a:spLocks/>
+          </p:cNvSpPr>
+          <p:nvPr/>
+        </p:nvSpPr>
+        <p:spPr>
+          <a:xfrm>
+            <a:off x="0" y="6260951"/>
+            <a:ext cx="12192000" cy="417047"/>
+          </a:xfrm>
+          <a:prstGeom prst="rect">
+            <a:avLst/>
+          </a:prstGeom>
+        </p:spPr>
+        <p:txBody>
+          <a:bodyPr vert="horz" lIns="91440" tIns="45720" rIns="91440" bIns="45720" rtlCol="0">
+            <a:normAutofit/>
+          </a:bodyPr>
+          <a:lstStyle>
+            <a:lvl1pPr marL="228600" indent="-228600" algn="l" defTabSz="914400" rtl="0" eaLnBrk="1" latinLnBrk="0" hangingPunct="1">
+              <a:lnSpc>
+                <a:spcPct val="90000"/>
+              </a:lnSpc>
+              <a:spcBef>
+                <a:spcPts val="1000"/>
+              </a:spcBef>
+              <a:buFont typeface="Arial" panose="020B0604020202020204" pitchFamily="34" charset="0"/>
+              <a:buChar char="•"/>
+              <a:defRPr sz="2800" kern="1200">
+                <a:solidFill>
+                  <a:schemeClr val="tx1"/>
+                </a:solidFill>
+                <a:latin typeface="+mn-lt"/>
+                <a:ea typeface="+mn-ea"/>
+                <a:cs typeface="+mn-cs"/>
+              </a:defRPr>
+            </a:lvl1pPr>
+            <a:lvl2pPr marL="685800" indent="-228600" algn="l" defTabSz="914400" rtl="0" eaLnBrk="1" latinLnBrk="0" hangingPunct="1">
+              <a:lnSpc>
+                <a:spcPct val="90000"/>
+              </a:lnSpc>
+              <a:spcBef>
+                <a:spcPts val="500"/>
+              </a:spcBef>
+              <a:buFont typeface="Arial" panose="020B0604020202020204" pitchFamily="34" charset="0"/>
+              <a:buChar char="•"/>
+              <a:defRPr sz="2400" kern="1200">
+                <a:solidFill>
+                  <a:schemeClr val="tx1"/>
+                </a:solidFill>
+                <a:latin typeface="+mn-lt"/>
+                <a:ea typeface="+mn-ea"/>
+                <a:cs typeface="+mn-cs"/>
+              </a:defRPr>
+            </a:lvl2pPr>
+            <a:lvl3pPr marL="1143000" indent="-228600" algn="l" defTabSz="914400" rtl="0" eaLnBrk="1" latinLnBrk="0" hangingPunct="1">
+              <a:lnSpc>
+                <a:spcPct val="90000"/>
+              </a:lnSpc>
+              <a:spcBef>
+                <a:spcPts val="500"/>
+              </a:spcBef>
+              <a:buFont typeface="Arial" panose="020B0604020202020204" pitchFamily="34" charset="0"/>
+              <a:buChar char="•"/>
+              <a:defRPr sz="2000" kern="1200">
+                <a:solidFill>
+                  <a:schemeClr val="tx1"/>
+                </a:solidFill>
+                <a:latin typeface="+mn-lt"/>
+                <a:ea typeface="+mn-ea"/>
+                <a:cs typeface="+mn-cs"/>
+              </a:defRPr>
+            </a:lvl3pPr>
+            <a:lvl4pPr marL="1600200" indent="-228600" algn="l" defTabSz="914400" rtl="0" eaLnBrk="1" latinLnBrk="0" hangingPunct="1">
+              <a:lnSpc>
+                <a:spcPct val="90000"/>
+              </a:lnSpc>
+              <a:spcBef>
+                <a:spcPts val="500"/>
+              </a:spcBef>
+              <a:buFont typeface="Arial" panose="020B0604020202020204" pitchFamily="34" charset="0"/>
+              <a:buChar char="•"/>
+              <a:defRPr sz="1800" kern="1200">
+                <a:solidFill>
+                  <a:schemeClr val="tx1"/>
+                </a:solidFill>
+                <a:latin typeface="+mn-lt"/>
+                <a:ea typeface="+mn-ea"/>
+                <a:cs typeface="+mn-cs"/>
+              </a:defRPr>
+            </a:lvl4pPr>
+            <a:lvl5pPr marL="2057400" indent="-228600" algn="l" defTabSz="914400" rtl="0" eaLnBrk="1" latinLnBrk="0" hangingPunct="1">
+              <a:lnSpc>
+                <a:spcPct val="90000"/>
+              </a:lnSpc>
+              <a:spcBef>
+                <a:spcPts val="500"/>
+              </a:spcBef>
+              <a:buFont typeface="Arial" panose="020B0604020202020204" pitchFamily="34" charset="0"/>
+              <a:buChar char="•"/>
+              <a:defRPr sz="1800" kern="1200">
+                <a:solidFill>
+                  <a:schemeClr val="tx1"/>
+                </a:solidFill>
+                <a:latin typeface="+mn-lt"/>
+                <a:ea typeface="+mn-ea"/>
+                <a:cs typeface="+mn-cs"/>
+              </a:defRPr>
+            </a:lvl5pPr>
+            <a:lvl6pPr marL="2514600" indent="-228600" algn="l" defTabSz="914400" rtl="0" eaLnBrk="1" latinLnBrk="0" hangingPunct="1">
+              <a:lnSpc>
+                <a:spcPct val="90000"/>
+              </a:lnSpc>
+              <a:spcBef>
+                <a:spcPts val="500"/>
+              </a:spcBef>
+              <a:buFont typeface="Arial" panose="020B0604020202020204" pitchFamily="34" charset="0"/>
+              <a:buChar char="•"/>
+              <a:defRPr sz="1800" kern="1200">
+                <a:solidFill>
+                  <a:schemeClr val="tx1"/>
+                </a:solidFill>
+                <a:latin typeface="+mn-lt"/>
+                <a:ea typeface="+mn-ea"/>
+                <a:cs typeface="+mn-cs"/>
+              </a:defRPr>
+            </a:lvl6pPr>
+            <a:lvl7pPr marL="2971800" indent="-228600" algn="l" defTabSz="914400" rtl="0" eaLnBrk="1" latinLnBrk="0" hangingPunct="1">
+              <a:lnSpc>
+                <a:spcPct val="90000"/>
+              </a:lnSpc>
+              <a:spcBef>
+                <a:spcPts val="500"/>
+              </a:spcBef>
+              <a:buFont typeface="Arial" panose="020B0604020202020204" pitchFamily="34" charset="0"/>
+              <a:buChar char="•"/>
+              <a:defRPr sz="1800" kern="1200">
+                <a:solidFill>
+                  <a:schemeClr val="tx1"/>
+                </a:solidFill>
+                <a:latin typeface="+mn-lt"/>
+                <a:ea typeface="+mn-ea"/>
+                <a:cs typeface="+mn-cs"/>
+              </a:defRPr>
+            </a:lvl7pPr>
+            <a:lvl8pPr marL="3429000" indent="-228600" algn="l" defTabSz="914400" rtl="0" eaLnBrk="1" latinLnBrk="0" hangingPunct="1">
+              <a:lnSpc>
+                <a:spcPct val="90000"/>
+              </a:lnSpc>
+              <a:spcBef>
+                <a:spcPts val="500"/>
+              </a:spcBef>
+              <a:buFont typeface="Arial" panose="020B0604020202020204" pitchFamily="34" charset="0"/>
+              <a:buChar char="•"/>
+              <a:defRPr sz="1800" kern="1200">
+                <a:solidFill>
+                  <a:schemeClr val="tx1"/>
+                </a:solidFill>
+                <a:latin typeface="+mn-lt"/>
+                <a:ea typeface="+mn-ea"/>
+                <a:cs typeface="+mn-cs"/>
+              </a:defRPr>
+            </a:lvl8pPr>
+            <a:lvl9pPr marL="3886200" indent="-228600" algn="l" defTabSz="914400" rtl="0" eaLnBrk="1" latinLnBrk="0" hangingPunct="1">
+              <a:lnSpc>
+                <a:spcPct val="90000"/>
+              </a:lnSpc>
+              <a:spcBef>
+                <a:spcPts val="500"/>
+              </a:spcBef>
+              <a:buFont typeface="Arial" panose="020B0604020202020204" pitchFamily="34" charset="0"/>
+              <a:buChar char="•"/>
+              <a:defRPr sz="1800" kern="1200">
+                <a:solidFill>
+                  <a:schemeClr val="tx1"/>
+                </a:solidFill>
+                <a:latin typeface="+mn-lt"/>
+                <a:ea typeface="+mn-ea"/>
+                <a:cs typeface="+mn-cs"/>
+              </a:defRPr>
+            </a:lvl9pPr>
+          </a:lstStyle>
+          <a:p>
+            <a:pPr marL="0" indent="0" algn="ctr">
+              <a:buFont typeface="Arial" panose="020B0604020202020204" pitchFamily="34" charset="0"/>
+              <a:buNone/>
+            </a:pPr>
+            <a:r>
+              <a:rPr lang="pl-PL" sz="2000" dirty="0">
+                <a:latin typeface="Arial" panose="020B0604020202020204" pitchFamily="34" charset="0"/>
+                <a:cs typeface="Arial" panose="020B0604020202020204" pitchFamily="34" charset="0"/>
+              </a:rPr>
+              <a:t>4</a:t>
+            </a:r>
+            <a:endParaRPr lang="pl-PL" sz="1800" dirty="0">
+              <a:latin typeface="Arial" panose="020B0604020202020204" pitchFamily="34" charset="0"/>
+              <a:cs typeface="Arial" panose="020B0604020202020204" pitchFamily="34" charset="0"/>
+            </a:endParaRPr>
+          </a:p>
+        </p:txBody>
+      </p:sp>
+      <p:pic>
+        <p:nvPicPr>
+          <p:cNvPr id="3" name="Obraz 2">
+            <a:extLst>
+              <a:ext uri="{FF2B5EF4-FFF2-40B4-BE49-F238E27FC236}">
+                <a16:creationId xmlns:a16="http://schemas.microsoft.com/office/drawing/2014/main" id="{4A880175-DDDC-43E9-9346-BE2C32465220}"/>
+              </a:ext>
+            </a:extLst>
+          </p:cNvPr>
+          <p:cNvPicPr>
+            <a:picLocks noChangeAspect="1"/>
+          </p:cNvPicPr>
+          <p:nvPr/>
+        </p:nvPicPr>
+        <p:blipFill>
+          <a:blip r:embed="rId2">
+            <a:extLst>
+              <a:ext uri="{28A0092B-C50C-407E-A947-70E740481C1C}">
+                <a14:useLocalDpi xmlns:a14="http://schemas.microsoft.com/office/drawing/2010/main" val="0"/>
+              </a:ext>
+            </a:extLst>
+          </a:blip>
+          <a:stretch>
+            <a:fillRect/>
+          </a:stretch>
+        </p:blipFill>
+        <p:spPr>
+          <a:xfrm>
+            <a:off x="1080000" y="2648498"/>
+            <a:ext cx="10032000" cy="3721197"/>
+          </a:xfrm>
+          <a:prstGeom prst="rect">
+            <a:avLst/>
+          </a:prstGeom>
+        </p:spPr>
+      </p:pic>
+    </p:spTree>
+    <p:extLst>
+      <p:ext uri="{BB962C8B-B14F-4D97-AF65-F5344CB8AC3E}">
+        <p14:creationId xmlns:p14="http://schemas.microsoft.com/office/powerpoint/2010/main" val="2478496760"/>
+      </p:ext>
+    </p:extLst>
+  </p:cSld>
+  <p:clrMapOvr>
+    <a:masterClrMapping/>
+  </p:clrMapOvr>
+</p:sld>
+</file>
+
+<file path=ppt/slides/slide7.xml><?xml version="1.0" encoding="utf-8"?>
 <p:sld xmlns:a="http://schemas.openxmlformats.org/drawingml/2006/main" xmlns:r="http://schemas.openxmlformats.org/officeDocument/2006/relationships" xmlns:p="http://schemas.openxmlformats.org/presentationml/2006/main">
   <p:cSld>
     <p:spTree>

</xml_diff>

<commit_message>
Fixed comments and plots info
</commit_message>
<xml_diff>
--- a/casestudy.pptx
+++ b/casestudy.pptx
@@ -3392,7 +3392,7 @@
                 <a:latin typeface="Arial" panose="020B0604020202020204" pitchFamily="34" charset="0"/>
                 <a:cs typeface="Arial" panose="020B0604020202020204" pitchFamily="34" charset="0"/>
               </a:rPr>
-              <a:t>po uzyskaniu dyplomu</a:t>
+              <a:t>od uzyskania dyplomu</a:t>
             </a:r>
           </a:p>
         </p:txBody>
@@ -3415,7 +3415,7 @@
         </p:nvSpPr>
         <p:spPr>
           <a:xfrm>
-            <a:off x="1080001" y="3750197"/>
+            <a:off x="1080001" y="2825963"/>
             <a:ext cx="9788628" cy="3107803"/>
           </a:xfrm>
         </p:spPr>
@@ -4407,7 +4407,7 @@
                 <a:latin typeface="Arial" panose="020B0604020202020204" pitchFamily="34" charset="0"/>
                 <a:cs typeface="Arial" panose="020B0604020202020204" pitchFamily="34" charset="0"/>
               </a:rPr>
-              <a:t>	Ponad połowa absolwentów uzyskała dyplom magistra na kierunku </a:t>
+              <a:t>Ponad połowa absolwentów uzyskała dyplom magistra na kierunku </a:t>
             </a:r>
             <a:br>
               <a:rPr lang="pl-PL" sz="2300" dirty="0">
@@ -4642,42 +4642,6 @@
           </a:p>
         </p:txBody>
       </p:sp>
-      <p:pic>
-        <p:nvPicPr>
-          <p:cNvPr id="24" name="Obraz 23">
-            <a:extLst>
-              <a:ext uri="{FF2B5EF4-FFF2-40B4-BE49-F238E27FC236}">
-                <a16:creationId xmlns:a16="http://schemas.microsoft.com/office/drawing/2014/main" id="{A12D4AA6-AC26-4312-BEC0-646E19AEA275}"/>
-              </a:ext>
-            </a:extLst>
-          </p:cNvPr>
-          <p:cNvPicPr>
-            <a:picLocks noChangeAspect="1"/>
-          </p:cNvPicPr>
-          <p:nvPr/>
-        </p:nvPicPr>
-        <p:blipFill>
-          <a:blip r:embed="rId2">
-            <a:extLst>
-              <a:ext uri="{28A0092B-C50C-407E-A947-70E740481C1C}">
-                <a14:useLocalDpi xmlns:a14="http://schemas.microsoft.com/office/drawing/2010/main" val="0"/>
-              </a:ext>
-            </a:extLst>
-          </a:blip>
-          <a:stretch>
-            <a:fillRect/>
-          </a:stretch>
-        </p:blipFill>
-        <p:spPr>
-          <a:xfrm>
-            <a:off x="1046827" y="2275173"/>
-            <a:ext cx="10098345" cy="4101703"/>
-          </a:xfrm>
-          <a:prstGeom prst="rect">
-            <a:avLst/>
-          </a:prstGeom>
-        </p:spPr>
-      </p:pic>
     </p:spTree>
     <p:extLst>
       <p:ext uri="{BB962C8B-B14F-4D97-AF65-F5344CB8AC3E}">
@@ -4794,7 +4758,7 @@
                 <a:latin typeface="Arial" panose="020B0604020202020204" pitchFamily="34" charset="0"/>
                 <a:cs typeface="Arial" panose="020B0604020202020204" pitchFamily="34" charset="0"/>
               </a:rPr>
-              <a:t>	Ponad połowa badanych studentów ukończyła studia magisterskie </a:t>
+              <a:t>Ponad połowa badanych studentów ukończyła studia magisterskie </a:t>
             </a:r>
             <a:br>
               <a:rPr lang="pl-PL" sz="2300" dirty="0">
@@ -5174,7 +5138,7 @@
                 <a:latin typeface="Arial" panose="020B0604020202020204" pitchFamily="34" charset="0"/>
                 <a:cs typeface="Arial" panose="020B0604020202020204" pitchFamily="34" charset="0"/>
               </a:rPr>
-              <a:t>	Ponad połowa absolwentów studiów społecznych ukończyła studia </a:t>
+              <a:t>Ponad połowa absolwentów studiów społecznych ukończyła studia </a:t>
             </a:r>
             <a:br>
               <a:rPr lang="pl-PL" sz="2300" dirty="0">
@@ -5587,7 +5551,7 @@
                 <a:latin typeface="Arial" panose="020B0604020202020204" pitchFamily="34" charset="0"/>
                 <a:cs typeface="Arial" panose="020B0604020202020204" pitchFamily="34" charset="0"/>
               </a:rPr>
-              <a:t>	Zarobki połowy absolwentów po pięciu latach nie przekraczają 4000 złotych, </a:t>
+              <a:t>Zarobki połowy absolwentów po pięciu latach nie przekraczają 4000 złotych. </a:t>
             </a:r>
             <a:endParaRPr lang="pl-PL" sz="2300" dirty="0">
               <a:solidFill>

</xml_diff>